<commit_message>
Updata agenda of new course 06.06.2022
</commit_message>
<xml_diff>
--- a/docs/Python_06_Function_Module_Package.pptx
+++ b/docs/Python_06_Function_Module_Package.pptx
@@ -327,7 +327,7 @@
             <a:fld id="{6B92EADE-F6EB-4931-8983-31B1F884648A}" type="datetimeFigureOut">
               <a:rPr lang="en-US" smtClean="0"/>
               <a:pPr/>
-              <a:t>3/26/2021</a:t>
+              <a:t>2/3/2022</a:t>
             </a:fld>
             <a:endParaRPr lang="en-US"/>
           </a:p>
@@ -493,7 +493,7 @@
             <a:fld id="{6B92EADE-F6EB-4931-8983-31B1F884648A}" type="datetimeFigureOut">
               <a:rPr lang="en-US" smtClean="0"/>
               <a:pPr/>
-              <a:t>3/26/2021</a:t>
+              <a:t>2/3/2022</a:t>
             </a:fld>
             <a:endParaRPr lang="en-US"/>
           </a:p>
@@ -669,7 +669,7 @@
             <a:fld id="{6B92EADE-F6EB-4931-8983-31B1F884648A}" type="datetimeFigureOut">
               <a:rPr lang="en-US" smtClean="0"/>
               <a:pPr/>
-              <a:t>3/26/2021</a:t>
+              <a:t>2/3/2022</a:t>
             </a:fld>
             <a:endParaRPr lang="en-US"/>
           </a:p>
@@ -835,7 +835,7 @@
             <a:fld id="{6B92EADE-F6EB-4931-8983-31B1F884648A}" type="datetimeFigureOut">
               <a:rPr lang="en-US" smtClean="0"/>
               <a:pPr/>
-              <a:t>3/26/2021</a:t>
+              <a:t>2/3/2022</a:t>
             </a:fld>
             <a:endParaRPr lang="en-US"/>
           </a:p>
@@ -1078,7 +1078,7 @@
             <a:fld id="{6B92EADE-F6EB-4931-8983-31B1F884648A}" type="datetimeFigureOut">
               <a:rPr lang="en-US" smtClean="0"/>
               <a:pPr/>
-              <a:t>3/26/2021</a:t>
+              <a:t>2/3/2022</a:t>
             </a:fld>
             <a:endParaRPr lang="en-US"/>
           </a:p>
@@ -1343,7 +1343,7 @@
             <a:fld id="{6B92EADE-F6EB-4931-8983-31B1F884648A}" type="datetimeFigureOut">
               <a:rPr lang="en-US" smtClean="0"/>
               <a:pPr/>
-              <a:t>3/26/2021</a:t>
+              <a:t>2/3/2022</a:t>
             </a:fld>
             <a:endParaRPr lang="en-US"/>
           </a:p>
@@ -1722,7 +1722,7 @@
             <a:fld id="{6B92EADE-F6EB-4931-8983-31B1F884648A}" type="datetimeFigureOut">
               <a:rPr lang="en-US" smtClean="0"/>
               <a:pPr/>
-              <a:t>3/26/2021</a:t>
+              <a:t>2/3/2022</a:t>
             </a:fld>
             <a:endParaRPr lang="en-US"/>
           </a:p>
@@ -1873,7 +1873,7 @@
             <a:fld id="{6B92EADE-F6EB-4931-8983-31B1F884648A}" type="datetimeFigureOut">
               <a:rPr lang="en-US" smtClean="0"/>
               <a:pPr/>
-              <a:t>3/26/2021</a:t>
+              <a:t>2/3/2022</a:t>
             </a:fld>
             <a:endParaRPr lang="en-US"/>
           </a:p>
@@ -1965,7 +1965,7 @@
             <a:fld id="{6B92EADE-F6EB-4931-8983-31B1F884648A}" type="datetimeFigureOut">
               <a:rPr lang="en-US" smtClean="0"/>
               <a:pPr/>
-              <a:t>3/26/2021</a:t>
+              <a:t>2/3/2022</a:t>
             </a:fld>
             <a:endParaRPr lang="en-US"/>
           </a:p>
@@ -2227,7 +2227,7 @@
             <a:fld id="{6B92EADE-F6EB-4931-8983-31B1F884648A}" type="datetimeFigureOut">
               <a:rPr lang="en-US" smtClean="0"/>
               <a:pPr/>
-              <a:t>3/26/2021</a:t>
+              <a:t>2/3/2022</a:t>
             </a:fld>
             <a:endParaRPr lang="en-US"/>
           </a:p>
@@ -2516,7 +2516,7 @@
             <a:fld id="{6B92EADE-F6EB-4931-8983-31B1F884648A}" type="datetimeFigureOut">
               <a:rPr lang="en-US" smtClean="0"/>
               <a:pPr/>
-              <a:t>3/26/2021</a:t>
+              <a:t>2/3/2022</a:t>
             </a:fld>
             <a:endParaRPr lang="en-US"/>
           </a:p>
@@ -3287,7 +3287,7 @@
             <a:fld id="{6B92EADE-F6EB-4931-8983-31B1F884648A}" type="datetimeFigureOut">
               <a:rPr lang="en-US" smtClean="0"/>
               <a:pPr/>
-              <a:t>3/26/2021</a:t>
+              <a:t>2/3/2022</a:t>
             </a:fld>
             <a:endParaRPr lang="en-US"/>
           </a:p>
@@ -4430,7 +4430,7 @@
             <a:avLst/>
           </a:prstGeom>
           <a:solidFill>
-            <a:srgbClr val="F4FBF4"/>
+            <a:schemeClr val="bg1"/>
           </a:solidFill>
           <a:ln w="9525">
             <a:noFill/>
@@ -4568,39 +4568,47 @@
           </a:p>
         </p:txBody>
       </p:sp>
-      <p:pic>
-        <p:nvPicPr>
-          <p:cNvPr id="11266" name="Picture 2"/>
-          <p:cNvPicPr>
-            <a:picLocks noChangeAspect="1" noChangeArrowheads="1"/>
-          </p:cNvPicPr>
+      <p:sp>
+        <p:nvSpPr>
+          <p:cNvPr id="7" name="TextBox 6">
+            <a:extLst>
+              <a:ext uri="{FF2B5EF4-FFF2-40B4-BE49-F238E27FC236}">
+                <a16:creationId xmlns:a16="http://schemas.microsoft.com/office/drawing/2014/main" id="{35EC5536-D6B9-4331-B320-94E5B134E6CD}"/>
+              </a:ext>
+            </a:extLst>
+          </p:cNvPr>
+          <p:cNvSpPr txBox="1"/>
           <p:nvPr/>
-        </p:nvPicPr>
-        <p:blipFill>
-          <a:blip r:embed="rId2"/>
-          <a:srcRect/>
-          <a:stretch>
-            <a:fillRect/>
-          </a:stretch>
-        </p:blipFill>
-        <p:spPr bwMode="auto">
+        </p:nvSpPr>
+        <p:spPr>
           <a:xfrm>
-            <a:off x="2840038" y="4895623"/>
-            <a:ext cx="4678362" cy="1769536"/>
+            <a:off x="2931885" y="5199805"/>
+            <a:ext cx="6109854" cy="954107"/>
           </a:xfrm>
           <a:prstGeom prst="rect">
             <a:avLst/>
           </a:prstGeom>
           <a:noFill/>
-          <a:ln w="9525">
-            <a:noFill/>
-            <a:miter lim="800000"/>
-            <a:headEnd/>
-            <a:tailEnd/>
-          </a:ln>
-          <a:effectLst/>
         </p:spPr>
-      </p:pic>
+        <p:txBody>
+          <a:bodyPr wrap="square">
+            <a:spAutoFit/>
+          </a:bodyPr>
+          <a:lstStyle/>
+          <a:p>
+            <a:r>
+              <a:rPr lang="en-US" sz="2800"/>
+              <a:t>cube = lambda x: x*x*x</a:t>
+            </a:r>
+          </a:p>
+          <a:p>
+            <a:r>
+              <a:rPr lang="en-US" sz="2800"/>
+              <a:t>print(cube(3))</a:t>
+            </a:r>
+          </a:p>
+        </p:txBody>
+      </p:sp>
     </p:spTree>
   </p:cSld>
   <p:clrMapOvr>

</xml_diff>